<commit_message>
changed ortho var model in pptx
</commit_message>
<xml_diff>
--- a/Lab8_ATM_Interface/SWPLE_Lab8_ATM_Interface.pptx
+++ b/Lab8_ATM_Interface/SWPLE_Lab8_ATM_Interface.pptx
@@ -108,6 +108,11 @@
       </a:defRPr>
     </a:lvl9pPr>
   </p:defaultTextStyle>
+  <p:extLst>
+    <p:ext uri="{EFAFB233-063F-42B5-8137-9DF3F51BA10A}">
+      <p15:sldGuideLst xmlns:p15="http://schemas.microsoft.com/office/powerpoint/2012/main"/>
+    </p:ext>
+  </p:extLst>
 </p:presentation>
 </file>
 
@@ -242,7 +247,7 @@
           <a:p>
             <a:fld id="{BC603908-E805-4952-A74B-C4172334C733}" type="datetimeFigureOut">
               <a:rPr lang="de-DE" smtClean="0"/>
-              <a:t>19.12.2018</a:t>
+              <a:t>20.12.2018</a:t>
             </a:fld>
             <a:endParaRPr lang="de-DE"/>
           </a:p>
@@ -412,7 +417,7 @@
           <a:p>
             <a:fld id="{BC603908-E805-4952-A74B-C4172334C733}" type="datetimeFigureOut">
               <a:rPr lang="de-DE" smtClean="0"/>
-              <a:t>19.12.2018</a:t>
+              <a:t>20.12.2018</a:t>
             </a:fld>
             <a:endParaRPr lang="de-DE"/>
           </a:p>
@@ -592,7 +597,7 @@
           <a:p>
             <a:fld id="{BC603908-E805-4952-A74B-C4172334C733}" type="datetimeFigureOut">
               <a:rPr lang="de-DE" smtClean="0"/>
-              <a:t>19.12.2018</a:t>
+              <a:t>20.12.2018</a:t>
             </a:fld>
             <a:endParaRPr lang="de-DE"/>
           </a:p>
@@ -762,7 +767,7 @@
           <a:p>
             <a:fld id="{BC603908-E805-4952-A74B-C4172334C733}" type="datetimeFigureOut">
               <a:rPr lang="de-DE" smtClean="0"/>
-              <a:t>19.12.2018</a:t>
+              <a:t>20.12.2018</a:t>
             </a:fld>
             <a:endParaRPr lang="de-DE"/>
           </a:p>
@@ -1008,7 +1013,7 @@
           <a:p>
             <a:fld id="{BC603908-E805-4952-A74B-C4172334C733}" type="datetimeFigureOut">
               <a:rPr lang="de-DE" smtClean="0"/>
-              <a:t>19.12.2018</a:t>
+              <a:t>20.12.2018</a:t>
             </a:fld>
             <a:endParaRPr lang="de-DE"/>
           </a:p>
@@ -1240,7 +1245,7 @@
           <a:p>
             <a:fld id="{BC603908-E805-4952-A74B-C4172334C733}" type="datetimeFigureOut">
               <a:rPr lang="de-DE" smtClean="0"/>
-              <a:t>19.12.2018</a:t>
+              <a:t>20.12.2018</a:t>
             </a:fld>
             <a:endParaRPr lang="de-DE"/>
           </a:p>
@@ -1607,7 +1612,7 @@
           <a:p>
             <a:fld id="{BC603908-E805-4952-A74B-C4172334C733}" type="datetimeFigureOut">
               <a:rPr lang="de-DE" smtClean="0"/>
-              <a:t>19.12.2018</a:t>
+              <a:t>20.12.2018</a:t>
             </a:fld>
             <a:endParaRPr lang="de-DE"/>
           </a:p>
@@ -1725,7 +1730,7 @@
           <a:p>
             <a:fld id="{BC603908-E805-4952-A74B-C4172334C733}" type="datetimeFigureOut">
               <a:rPr lang="de-DE" smtClean="0"/>
-              <a:t>19.12.2018</a:t>
+              <a:t>20.12.2018</a:t>
             </a:fld>
             <a:endParaRPr lang="de-DE"/>
           </a:p>
@@ -1820,7 +1825,7 @@
           <a:p>
             <a:fld id="{BC603908-E805-4952-A74B-C4172334C733}" type="datetimeFigureOut">
               <a:rPr lang="de-DE" smtClean="0"/>
-              <a:t>19.12.2018</a:t>
+              <a:t>20.12.2018</a:t>
             </a:fld>
             <a:endParaRPr lang="de-DE"/>
           </a:p>
@@ -2097,7 +2102,7 @@
           <a:p>
             <a:fld id="{BC603908-E805-4952-A74B-C4172334C733}" type="datetimeFigureOut">
               <a:rPr lang="de-DE" smtClean="0"/>
-              <a:t>19.12.2018</a:t>
+              <a:t>20.12.2018</a:t>
             </a:fld>
             <a:endParaRPr lang="de-DE"/>
           </a:p>
@@ -2350,7 +2355,7 @@
           <a:p>
             <a:fld id="{BC603908-E805-4952-A74B-C4172334C733}" type="datetimeFigureOut">
               <a:rPr lang="de-DE" smtClean="0"/>
-              <a:t>19.12.2018</a:t>
+              <a:t>20.12.2018</a:t>
             </a:fld>
             <a:endParaRPr lang="de-DE"/>
           </a:p>
@@ -2563,7 +2568,7 @@
           <a:p>
             <a:fld id="{BC603908-E805-4952-A74B-C4172334C733}" type="datetimeFigureOut">
               <a:rPr lang="de-DE" smtClean="0"/>
-              <a:t>19.12.2018</a:t>
+              <a:t>20.12.2018</a:t>
             </a:fld>
             <a:endParaRPr lang="de-DE"/>
           </a:p>
@@ -6501,7 +6506,7 @@
           <a:p>
             <a:r>
               <a:rPr lang="de-DE" dirty="0" smtClean="0"/>
-              <a:t>0</a:t>
+              <a:t>1</a:t>
             </a:r>
             <a:r>
               <a:rPr lang="en-DE" dirty="0" smtClean="0"/>
@@ -6716,6 +6721,123 @@
           </a:p>
         </p:txBody>
       </p:sp>
+      <p:cxnSp>
+        <p:nvCxnSpPr>
+          <p:cNvPr id="24" name="Gerade Verbindung mit Pfeil 23"/>
+          <p:cNvCxnSpPr>
+            <a:stCxn id="7" idx="2"/>
+          </p:cNvCxnSpPr>
+          <p:nvPr/>
+        </p:nvCxnSpPr>
+        <p:spPr>
+          <a:xfrm>
+            <a:off x="887390" y="2803196"/>
+            <a:ext cx="3145159" cy="1477859"/>
+          </a:xfrm>
+          <a:prstGeom prst="straightConnector1">
+            <a:avLst/>
+          </a:prstGeom>
+          <a:ln>
+            <a:solidFill>
+              <a:schemeClr val="tx1"/>
+            </a:solidFill>
+            <a:prstDash val="sysDash"/>
+            <a:tailEnd type="triangle"/>
+          </a:ln>
+        </p:spPr>
+        <p:style>
+          <a:lnRef idx="1">
+            <a:schemeClr val="accent1"/>
+          </a:lnRef>
+          <a:fillRef idx="0">
+            <a:schemeClr val="accent1"/>
+          </a:fillRef>
+          <a:effectRef idx="0">
+            <a:schemeClr val="accent1"/>
+          </a:effectRef>
+          <a:fontRef idx="minor">
+            <a:schemeClr val="tx1"/>
+          </a:fontRef>
+        </p:style>
+      </p:cxnSp>
+      <p:cxnSp>
+        <p:nvCxnSpPr>
+          <p:cNvPr id="73" name="Gerade Verbindung mit Pfeil 72"/>
+          <p:cNvCxnSpPr>
+            <a:stCxn id="15" idx="0"/>
+          </p:cNvCxnSpPr>
+          <p:nvPr/>
+        </p:nvCxnSpPr>
+        <p:spPr>
+          <a:xfrm flipV="1">
+            <a:off x="2679295" y="878144"/>
+            <a:ext cx="6020911" cy="1226783"/>
+          </a:xfrm>
+          <a:prstGeom prst="straightConnector1">
+            <a:avLst/>
+          </a:prstGeom>
+          <a:ln>
+            <a:solidFill>
+              <a:schemeClr val="tx1"/>
+            </a:solidFill>
+            <a:prstDash val="sysDash"/>
+            <a:tailEnd type="triangle"/>
+          </a:ln>
+        </p:spPr>
+        <p:style>
+          <a:lnRef idx="1">
+            <a:schemeClr val="accent1"/>
+          </a:lnRef>
+          <a:fillRef idx="0">
+            <a:schemeClr val="accent1"/>
+          </a:fillRef>
+          <a:effectRef idx="0">
+            <a:schemeClr val="accent1"/>
+          </a:effectRef>
+          <a:fontRef idx="minor">
+            <a:schemeClr val="tx1"/>
+          </a:fontRef>
+        </p:style>
+      </p:cxnSp>
+      <p:cxnSp>
+        <p:nvCxnSpPr>
+          <p:cNvPr id="78" name="Gerade Verbindung mit Pfeil 77"/>
+          <p:cNvCxnSpPr>
+            <a:stCxn id="18" idx="2"/>
+          </p:cNvCxnSpPr>
+          <p:nvPr/>
+        </p:nvCxnSpPr>
+        <p:spPr>
+          <a:xfrm>
+            <a:off x="4475366" y="2803196"/>
+            <a:ext cx="4288877" cy="1206674"/>
+          </a:xfrm>
+          <a:prstGeom prst="straightConnector1">
+            <a:avLst/>
+          </a:prstGeom>
+          <a:ln>
+            <a:solidFill>
+              <a:schemeClr val="tx1"/>
+            </a:solidFill>
+            <a:prstDash val="sysDash"/>
+            <a:tailEnd type="triangle"/>
+          </a:ln>
+        </p:spPr>
+        <p:style>
+          <a:lnRef idx="1">
+            <a:schemeClr val="accent1"/>
+          </a:lnRef>
+          <a:fillRef idx="0">
+            <a:schemeClr val="accent1"/>
+          </a:fillRef>
+          <a:effectRef idx="0">
+            <a:schemeClr val="accent1"/>
+          </a:effectRef>
+          <a:fontRef idx="minor">
+            <a:schemeClr val="tx1"/>
+          </a:fontRef>
+        </p:style>
+      </p:cxnSp>
     </p:spTree>
     <p:extLst>
       <p:ext uri="{BB962C8B-B14F-4D97-AF65-F5344CB8AC3E}">
@@ -6920,11 +7042,7 @@
                     <a:p>
                       <a:r>
                         <a:rPr lang="de-DE" dirty="0" smtClean="0"/>
-                        <a:t>Need Visual Studio (</a:t>
-                      </a:r>
-                      <a:r>
-                        <a:rPr lang="de-DE" dirty="0" smtClean="0"/>
-                        <a:t>C# </a:t>
+                        <a:t>Need Visual Studio (C# </a:t>
                       </a:r>
                       <a:r>
                         <a:rPr lang="de-DE" dirty="0" err="1" smtClean="0"/>

</xml_diff>